<commit_message>
SCR 11 Priorisieren und Pflegen
Für die Promotion überarbeitet.
</commit_message>
<xml_diff>
--- a/training-cards/music moves/Scrum (SCR)/ger/apprentice/ger_SCR_11_Priorisieren_und_Pflegen_MM_A.pptx
+++ b/training-cards/music moves/Scrum (SCR)/ger/apprentice/ger_SCR_11_Priorisieren_und_Pflegen_MM_A.pptx
@@ -169,10 +169,9 @@
           </a:lstStyle>
           <a:p>
             <a:r>
-              <a:rPr lang="de-DE" dirty="0" smtClean="0"/>
+              <a:rPr lang="de-DE" dirty="0"/>
               <a:t>TITEL HINZUFÜGEN</a:t>
             </a:r>
-            <a:endParaRPr lang="de-DE" dirty="0"/>
           </a:p>
         </p:txBody>
       </p:sp>
@@ -203,35 +202,35 @@
           <a:p>
             <a:pPr lvl="0"/>
             <a:r>
-              <a:rPr lang="de-DE" smtClean="0"/>
+              <a:rPr lang="de-DE"/>
               <a:t>Mastertextformat bearbeiten</a:t>
             </a:r>
           </a:p>
           <a:p>
             <a:pPr lvl="1"/>
             <a:r>
-              <a:rPr lang="de-DE" smtClean="0"/>
+              <a:rPr lang="de-DE"/>
               <a:t>Zweite Ebene</a:t>
             </a:r>
           </a:p>
           <a:p>
             <a:pPr lvl="2"/>
             <a:r>
-              <a:rPr lang="de-DE" smtClean="0"/>
+              <a:rPr lang="de-DE"/>
               <a:t>Dritte Ebene</a:t>
             </a:r>
           </a:p>
           <a:p>
             <a:pPr lvl="3"/>
             <a:r>
-              <a:rPr lang="de-DE" smtClean="0"/>
+              <a:rPr lang="de-DE"/>
               <a:t>Vierte Ebene</a:t>
             </a:r>
           </a:p>
           <a:p>
             <a:pPr lvl="4"/>
             <a:r>
-              <a:rPr lang="de-DE" smtClean="0"/>
+              <a:rPr lang="de-DE"/>
               <a:t>Fünfte Ebene</a:t>
             </a:r>
             <a:endParaRPr lang="de-DE" dirty="0"/>
@@ -278,7 +277,7 @@
               <a:buNone/>
             </a:pPr>
             <a:r>
-              <a:rPr lang="de-DE" smtClean="0"/>
+              <a:rPr lang="de-DE"/>
               <a:t>Master-Untertitelformat bearbeiten</a:t>
             </a:r>
             <a:endParaRPr lang="de-DE" dirty="0"/>
@@ -394,35 +393,35 @@
           <a:p>
             <a:pPr lvl="0"/>
             <a:r>
-              <a:rPr lang="de-DE" smtClean="0"/>
+              <a:rPr lang="de-DE"/>
               <a:t>Mastertextformat bearbeiten</a:t>
             </a:r>
           </a:p>
           <a:p>
             <a:pPr lvl="1"/>
             <a:r>
-              <a:rPr lang="de-DE" smtClean="0"/>
+              <a:rPr lang="de-DE"/>
               <a:t>Zweite Ebene</a:t>
             </a:r>
           </a:p>
           <a:p>
             <a:pPr lvl="2"/>
             <a:r>
-              <a:rPr lang="de-DE" smtClean="0"/>
+              <a:rPr lang="de-DE"/>
               <a:t>Dritte Ebene</a:t>
             </a:r>
           </a:p>
           <a:p>
             <a:pPr lvl="3"/>
             <a:r>
-              <a:rPr lang="de-DE" smtClean="0"/>
+              <a:rPr lang="de-DE"/>
               <a:t>Vierte Ebene</a:t>
             </a:r>
           </a:p>
           <a:p>
             <a:pPr lvl="4"/>
             <a:r>
-              <a:rPr lang="de-DE" smtClean="0"/>
+              <a:rPr lang="de-DE"/>
               <a:t>Fünfte Ebene</a:t>
             </a:r>
             <a:endParaRPr lang="de-DE" dirty="0"/>
@@ -452,7 +451,7 @@
           <a:lstStyle/>
           <a:p>
             <a:r>
-              <a:rPr lang="de-DE" sz="2400" dirty="0" smtClean="0">
+              <a:rPr lang="de-DE" sz="2400" dirty="0">
                 <a:solidFill>
                   <a:srgbClr val="7E006B"/>
                 </a:solidFill>
@@ -462,7 +461,7 @@
               <a:t>TRAININGS</a:t>
             </a:r>
             <a:r>
-              <a:rPr lang="de-DE" sz="2400" dirty="0" smtClean="0">
+              <a:rPr lang="de-DE" sz="2400" dirty="0">
                 <a:solidFill>
                   <a:srgbClr val="7E006B"/>
                 </a:solidFill>
@@ -530,7 +529,7 @@
           </a:ln>
           <a:extLst>
             <a:ext uri="{C572A759-6A51-4108-AA02-DFA0A04FC94B}">
-              <ma14:wrappingTextBoxFlag xmlns:ma14="http://schemas.microsoft.com/office/mac/drawingml/2011/main" val="1"/>
+              <ma14:wrappingTextBoxFlag xmlns:ma14="http://schemas.microsoft.com/office/mac/drawingml/2011/main" xmlns="" val="1"/>
             </a:ext>
           </a:extLst>
         </p:spPr>
@@ -636,7 +635,7 @@
                 <a:latin typeface="Avenir Light"/>
                 <a:cs typeface="Avenir Light"/>
               </a:rPr>
-              <a:t>20.02.16</a:t>
+              <a:t>19.09.18</a:t>
             </a:fld>
             <a:endParaRPr lang="de-DE" sz="600" dirty="0">
               <a:solidFill>
@@ -694,10 +693,9 @@
           <a:lstStyle/>
           <a:p>
             <a:r>
-              <a:rPr lang="de-DE" smtClean="0"/>
+              <a:rPr lang="de-DE"/>
               <a:t>Mastertitelformat bearbeiten</a:t>
             </a:r>
-            <a:endParaRPr lang="de-DE"/>
           </a:p>
         </p:txBody>
       </p:sp>
@@ -718,7 +716,7 @@
           <a:p>
             <a:fld id="{FF5B2BAF-DF38-0A48-A798-0C06E514FD52}" type="datetimeFigureOut">
               <a:rPr lang="de-DE" smtClean="0"/>
-              <a:t>20.02.16</a:t>
+              <a:t>19.09.18</a:t>
             </a:fld>
             <a:endParaRPr lang="de-DE" dirty="0"/>
           </a:p>
@@ -829,17 +827,16 @@
           <a:p>
             <a:pPr marL="0" lvl="0" algn="l"/>
             <a:r>
-              <a:rPr lang="de-DE" dirty="0" smtClean="0"/>
+              <a:rPr lang="de-DE" dirty="0"/>
               <a:t>Überschrift </a:t>
             </a:r>
             <a:br>
-              <a:rPr lang="de-DE" dirty="0" smtClean="0"/>
+              <a:rPr lang="de-DE" dirty="0"/>
             </a:br>
             <a:r>
-              <a:rPr lang="de-DE" dirty="0" smtClean="0"/>
+              <a:rPr lang="de-DE" dirty="0"/>
               <a:t>bearbeiten </a:t>
             </a:r>
-            <a:endParaRPr lang="de-DE" dirty="0"/>
           </a:p>
         </p:txBody>
       </p:sp>
@@ -870,38 +867,37 @@
           <a:p>
             <a:pPr lvl="0"/>
             <a:r>
-              <a:rPr lang="de-DE" dirty="0" smtClean="0"/>
+              <a:rPr lang="de-DE" dirty="0"/>
               <a:t>Mastertextformat bearbeiten</a:t>
             </a:r>
           </a:p>
           <a:p>
             <a:pPr lvl="1"/>
             <a:r>
-              <a:rPr lang="de-DE" dirty="0" smtClean="0"/>
+              <a:rPr lang="de-DE" dirty="0"/>
               <a:t>Zweite Ebene</a:t>
             </a:r>
           </a:p>
           <a:p>
             <a:pPr lvl="2"/>
             <a:r>
-              <a:rPr lang="de-DE" dirty="0" smtClean="0"/>
+              <a:rPr lang="de-DE" dirty="0"/>
               <a:t>Dritte Ebene</a:t>
             </a:r>
           </a:p>
           <a:p>
             <a:pPr lvl="3"/>
             <a:r>
-              <a:rPr lang="de-DE" dirty="0" smtClean="0"/>
+              <a:rPr lang="de-DE" dirty="0"/>
               <a:t>Vierte Ebene</a:t>
             </a:r>
           </a:p>
           <a:p>
             <a:pPr lvl="4"/>
             <a:r>
-              <a:rPr lang="de-DE" dirty="0" smtClean="0"/>
+              <a:rPr lang="de-DE" dirty="0"/>
               <a:t>Fünfte Ebene</a:t>
             </a:r>
-            <a:endParaRPr lang="de-DE" dirty="0"/>
           </a:p>
         </p:txBody>
       </p:sp>
@@ -940,7 +936,7 @@
           <a:p>
             <a:fld id="{FF5B2BAF-DF38-0A48-A798-0C06E514FD52}" type="datetimeFigureOut">
               <a:rPr lang="de-DE" smtClean="0"/>
-              <a:t>20.02.16</a:t>
+              <a:t>19.09.18</a:t>
             </a:fld>
             <a:endParaRPr lang="de-DE" dirty="0"/>
           </a:p>
@@ -1174,7 +1170,7 @@
           <a:lstStyle/>
           <a:p>
             <a:r>
-              <a:rPr lang="de-DE" sz="1050" b="1" dirty="0" smtClean="0">
+              <a:rPr lang="de-DE" sz="1050" b="1" dirty="0">
                 <a:solidFill>
                   <a:schemeClr val="bg1"/>
                 </a:solidFill>
@@ -1184,7 +1180,7 @@
               <a:t>TRAININGSKARTE</a:t>
             </a:r>
             <a:r>
-              <a:rPr lang="de-DE" sz="1050" dirty="0" smtClean="0">
+              <a:rPr lang="de-DE" sz="1050" dirty="0">
                 <a:solidFill>
                   <a:schemeClr val="bg1"/>
                 </a:solidFill>
@@ -1194,7 +1190,7 @@
               <a:t> </a:t>
             </a:r>
             <a:r>
-              <a:rPr lang="de-DE" sz="1050" b="1" dirty="0" smtClean="0">
+              <a:rPr lang="de-DE" sz="1050" b="1" dirty="0">
                 <a:solidFill>
                   <a:schemeClr val="bg1"/>
                 </a:solidFill>
@@ -1203,13 +1199,6 @@
               </a:rPr>
               <a:t>SCR 11</a:t>
             </a:r>
-            <a:endParaRPr lang="de-DE" sz="1050" b="1" dirty="0">
-              <a:solidFill>
-                <a:schemeClr val="bg1"/>
-              </a:solidFill>
-              <a:latin typeface="Avenir Heavy"/>
-              <a:cs typeface="Avenir Heavy"/>
-            </a:endParaRPr>
           </a:p>
         </p:txBody>
       </p:sp>
@@ -1592,17 +1581,16 @@
           <a:lstStyle/>
           <a:p>
             <a:r>
-              <a:rPr lang="de-DE" dirty="0" smtClean="0">
+              <a:rPr lang="de-DE" dirty="0">
                 <a:latin typeface="Avenir Heavy"/>
                 <a:cs typeface="Avenir Heavy"/>
               </a:rPr>
               <a:t>PFLEGEN </a:t>
             </a:r>
             <a:r>
-              <a:rPr lang="de-DE" dirty="0" smtClean="0"/>
+              <a:rPr lang="de-DE" dirty="0"/>
               <a:t>UND PRIORISIEREN</a:t>
             </a:r>
-            <a:endParaRPr lang="de-DE" dirty="0"/>
           </a:p>
         </p:txBody>
       </p:sp>
@@ -1633,7 +1621,7 @@
             </a:r>
             <a:r>
               <a:rPr lang="de-DE" sz="1200" dirty="0"/>
-              <a:t> angelegt hat (siehe SCR 10), kannst Du beginnen damit zu arbeiten.</a:t>
+              <a:t> angelegt hast (siehe SCR 10), kannst Du beginnen damit zu arbeiten.</a:t>
             </a:r>
           </a:p>
           <a:p>
@@ -1715,7 +1703,6 @@
               <a:rPr lang="de-DE" sz="1200" dirty="0"/>
               <a:t> gearbeitet wird.</a:t>
             </a:r>
-            <a:endParaRPr lang="de-DE" sz="1200" dirty="0"/>
           </a:p>
         </p:txBody>
       </p:sp>
@@ -1738,10 +1725,9 @@
               <a:buNone/>
             </a:pPr>
             <a:r>
-              <a:rPr lang="de-DE" dirty="0" smtClean="0"/>
+              <a:rPr lang="de-DE" dirty="0"/>
               <a:t>Regina Brandhuber</a:t>
             </a:r>
-            <a:endParaRPr lang="de-DE" dirty="0"/>
           </a:p>
         </p:txBody>
       </p:sp>
@@ -1842,9 +1828,14 @@
             </a:r>
             <a:r>
               <a:rPr lang="de-DE" dirty="0"/>
-              <a:t> jeweils mit einem Foto oder einem Screenshot, zeige es Deinem Team und lass Dich zertifizieren.</a:t>
-            </a:r>
-            <a:endParaRPr lang="de-DE" dirty="0"/>
+              <a:t> jeweils mit einem Foto oder einem Screenshot.</a:t>
+            </a:r>
+          </a:p>
+          <a:p>
+            <a:r>
+              <a:rPr lang="de-DE" dirty="0"/>
+              <a:t>So kannst du es Deinem Team zeigen.</a:t>
+            </a:r>
           </a:p>
         </p:txBody>
       </p:sp>

</xml_diff>

<commit_message>
SCR 11 neue Lizenzen eingepflegt
</commit_message>
<xml_diff>
--- a/training-cards/music moves/Scrum (SCR)/ger/apprentice/ger_SCR_11_Priorisieren_und_Pflegen_MM_A.pptx
+++ b/training-cards/music moves/Scrum (SCR)/ger/apprentice/ger_SCR_11_Priorisieren_und_Pflegen_MM_A.pptx
@@ -510,143 +510,6 @@
           </a:prstGeom>
         </p:spPr>
       </p:pic>
-      <p:sp>
-        <p:nvSpPr>
-          <p:cNvPr id="5" name="Shape 7"/>
-          <p:cNvSpPr/>
-          <p:nvPr userDrawn="1"/>
-        </p:nvSpPr>
-        <p:spPr>
-          <a:xfrm>
-            <a:off x="1683417" y="4952581"/>
-            <a:ext cx="4196016" cy="276995"/>
-          </a:xfrm>
-          <a:prstGeom prst="rect">
-            <a:avLst/>
-          </a:prstGeom>
-          <a:ln w="12700">
-            <a:miter lim="400000"/>
-          </a:ln>
-          <a:extLst>
-            <a:ext uri="{C572A759-6A51-4108-AA02-DFA0A04FC94B}">
-              <ma14:wrappingTextBoxFlag xmlns:ma14="http://schemas.microsoft.com/office/mac/drawingml/2011/main" xmlns="" val="1"/>
-            </a:ext>
-          </a:extLst>
-        </p:spPr>
-        <p:txBody>
-          <a:bodyPr wrap="none" lIns="45718" tIns="45718" rIns="45718" bIns="45718">
-            <a:spAutoFit/>
-          </a:bodyPr>
-          <a:lstStyle/>
-          <a:p>
-            <a:pPr lvl="0" algn="ctr">
-              <a:defRPr sz="1800"/>
-            </a:pPr>
-            <a:r>
-              <a:rPr sz="600" dirty="0">
-                <a:latin typeface="Avenir Light"/>
-                <a:ea typeface="Calibri"/>
-                <a:cs typeface="Avenir Light"/>
-                <a:sym typeface="Calibri"/>
-              </a:rPr>
-              <a:t>This work is licensed under the Creative Commons Attribution-NonCommercial-NoDerivatives 4.0 International License. </a:t>
-            </a:r>
-          </a:p>
-          <a:p>
-            <a:pPr lvl="0" algn="ctr">
-              <a:defRPr sz="1800"/>
-            </a:pPr>
-            <a:r>
-              <a:rPr sz="600" dirty="0">
-                <a:latin typeface="Avenir Light"/>
-                <a:ea typeface="Calibri"/>
-                <a:cs typeface="Avenir Light"/>
-                <a:sym typeface="Calibri"/>
-              </a:rPr>
-              <a:t>To view a copy of this license, visit http://creativecommons.org/licenses/by-nc-nd/4.0/.</a:t>
-            </a:r>
-          </a:p>
-        </p:txBody>
-      </p:sp>
-      <p:pic>
-        <p:nvPicPr>
-          <p:cNvPr id="6" name="pasted-image.tif"/>
-          <p:cNvPicPr/>
-          <p:nvPr userDrawn="1"/>
-        </p:nvPicPr>
-        <p:blipFill>
-          <a:blip r:embed="rId4">
-            <a:extLst/>
-          </a:blip>
-          <a:stretch>
-            <a:fillRect/>
-          </a:stretch>
-        </p:blipFill>
-        <p:spPr>
-          <a:xfrm>
-            <a:off x="6174185" y="4992838"/>
-            <a:ext cx="886619" cy="214128"/>
-          </a:xfrm>
-          <a:prstGeom prst="rect">
-            <a:avLst/>
-          </a:prstGeom>
-          <a:ln w="12700">
-            <a:miter lim="400000"/>
-          </a:ln>
-        </p:spPr>
-      </p:pic>
-      <p:sp>
-        <p:nvSpPr>
-          <p:cNvPr id="7" name="Textfeld 6"/>
-          <p:cNvSpPr txBox="1"/>
-          <p:nvPr userDrawn="1"/>
-        </p:nvSpPr>
-        <p:spPr>
-          <a:xfrm>
-            <a:off x="239285" y="4936890"/>
-            <a:ext cx="1044856" cy="276999"/>
-          </a:xfrm>
-          <a:prstGeom prst="rect">
-            <a:avLst/>
-          </a:prstGeom>
-          <a:noFill/>
-        </p:spPr>
-        <p:txBody>
-          <a:bodyPr wrap="square" rtlCol="0">
-            <a:spAutoFit/>
-          </a:bodyPr>
-          <a:lstStyle/>
-          <a:p>
-            <a:r>
-              <a:rPr lang="de-DE" sz="600" dirty="0">
-                <a:solidFill>
-                  <a:srgbClr val="5D5E5F"/>
-                </a:solidFill>
-                <a:latin typeface="Avenir Light"/>
-                <a:cs typeface="Avenir Light"/>
-              </a:rPr>
-              <a:t>Letzte Änderung: </a:t>
-            </a:r>
-            <a:fld id="{7A8C7DAC-E536-564C-B5B3-90E8FAB50562}" type="datetime1">
-              <a:rPr lang="de-DE" sz="600" smtClean="0">
-                <a:solidFill>
-                  <a:srgbClr val="5D5E5F"/>
-                </a:solidFill>
-                <a:latin typeface="Avenir Light"/>
-                <a:cs typeface="Avenir Light"/>
-              </a:rPr>
-              <a:t>19.09.18</a:t>
-            </a:fld>
-            <a:endParaRPr lang="de-DE" sz="600" dirty="0">
-              <a:solidFill>
-                <a:srgbClr val="5D5E5F"/>
-              </a:solidFill>
-              <a:latin typeface="Avenir Light"/>
-              <a:cs typeface="Avenir Light"/>
-            </a:endParaRPr>
-          </a:p>
-        </p:txBody>
-      </p:sp>
     </p:spTree>
     <p:extLst>
       <p:ext uri="{BB962C8B-B14F-4D97-AF65-F5344CB8AC3E}">
@@ -716,7 +579,7 @@
           <a:p>
             <a:fld id="{FF5B2BAF-DF38-0A48-A798-0C06E514FD52}" type="datetimeFigureOut">
               <a:rPr lang="de-DE" smtClean="0"/>
-              <a:t>19.09.18</a:t>
+              <a:t>27.07.23</a:t>
             </a:fld>
             <a:endParaRPr lang="de-DE" dirty="0"/>
           </a:p>
@@ -936,7 +799,7 @@
           <a:p>
             <a:fld id="{FF5B2BAF-DF38-0A48-A798-0C06E514FD52}" type="datetimeFigureOut">
               <a:rPr lang="de-DE" smtClean="0"/>
-              <a:t>19.09.18</a:t>
+              <a:t>27.07.23</a:t>
             </a:fld>
             <a:endParaRPr lang="de-DE" dirty="0"/>
           </a:p>
@@ -1839,6 +1702,314 @@
           </a:p>
         </p:txBody>
       </p:sp>
+      <p:sp>
+        <p:nvSpPr>
+          <p:cNvPr id="3" name="Shape 7">
+            <a:extLst>
+              <a:ext uri="{FF2B5EF4-FFF2-40B4-BE49-F238E27FC236}">
+                <a16:creationId xmlns:a16="http://schemas.microsoft.com/office/drawing/2014/main" id="{B2FC242B-3F7C-1BDC-3DF1-8FE0DB47BCF2}"/>
+              </a:ext>
+            </a:extLst>
+          </p:cNvPr>
+          <p:cNvSpPr/>
+          <p:nvPr/>
+        </p:nvSpPr>
+        <p:spPr>
+          <a:xfrm>
+            <a:off x="971550" y="4689585"/>
+            <a:ext cx="4691860" cy="461661"/>
+          </a:xfrm>
+          <a:prstGeom prst="rect">
+            <a:avLst/>
+          </a:prstGeom>
+          <a:ln w="12700">
+            <a:miter lim="400000"/>
+          </a:ln>
+          <a:extLst>
+            <a:ext uri="{C572A759-6A51-4108-AA02-DFA0A04FC94B}">
+              <ma14:wrappingTextBoxFlag xmlns="" xmlns:ma14="http://schemas.microsoft.com/office/mac/drawingml/2011/main" val="1"/>
+            </a:ext>
+          </a:extLst>
+        </p:spPr>
+        <p:txBody>
+          <a:bodyPr wrap="square" lIns="45718" tIns="45718" rIns="45718" bIns="45718">
+            <a:spAutoFit/>
+          </a:bodyPr>
+          <a:lstStyle/>
+          <a:p>
+            <a:pPr lvl="0" algn="ctr">
+              <a:defRPr sz="1800"/>
+            </a:pPr>
+            <a:r>
+              <a:rPr lang="de-DE" sz="800" b="0" i="0" u="none" strike="noStrike" dirty="0" err="1">
+                <a:solidFill>
+                  <a:schemeClr val="tx1">
+                    <a:lumMod val="65000"/>
+                    <a:lumOff val="35000"/>
+                  </a:schemeClr>
+                </a:solidFill>
+                <a:effectLst/>
+                <a:latin typeface="Avenir Book" panose="02000503020000020003" pitchFamily="2" charset="0"/>
+              </a:rPr>
+              <a:t>music</a:t>
+            </a:r>
+            <a:r>
+              <a:rPr lang="de-DE" sz="800" b="0" i="0" u="none" strike="noStrike" dirty="0">
+                <a:solidFill>
+                  <a:schemeClr val="tx1">
+                    <a:lumMod val="65000"/>
+                    <a:lumOff val="35000"/>
+                  </a:schemeClr>
+                </a:solidFill>
+                <a:effectLst/>
+                <a:latin typeface="Avenir Book" panose="02000503020000020003" pitchFamily="2" charset="0"/>
+              </a:rPr>
+              <a:t> </a:t>
+            </a:r>
+            <a:r>
+              <a:rPr lang="de-DE" sz="800" b="0" i="0" u="none" strike="noStrike" dirty="0" err="1">
+                <a:solidFill>
+                  <a:schemeClr val="tx1">
+                    <a:lumMod val="65000"/>
+                    <a:lumOff val="35000"/>
+                  </a:schemeClr>
+                </a:solidFill>
+                <a:effectLst/>
+                <a:latin typeface="Avenir Book" panose="02000503020000020003" pitchFamily="2" charset="0"/>
+              </a:rPr>
+              <a:t>moves</a:t>
+            </a:r>
+            <a:r>
+              <a:rPr lang="de-DE" sz="800" b="0" i="0" u="none" strike="noStrike" dirty="0">
+                <a:solidFill>
+                  <a:schemeClr val="tx1">
+                    <a:lumMod val="65000"/>
+                    <a:lumOff val="35000"/>
+                  </a:schemeClr>
+                </a:solidFill>
+                <a:effectLst/>
+                <a:latin typeface="Avenir Book" panose="02000503020000020003" pitchFamily="2" charset="0"/>
+              </a:rPr>
+              <a:t>-Trainingskarten von Regina Brandhuber sind lizenziert unter einer Creative Commons </a:t>
+            </a:r>
+          </a:p>
+          <a:p>
+            <a:pPr lvl="0" algn="ctr">
+              <a:defRPr sz="1800"/>
+            </a:pPr>
+            <a:r>
+              <a:rPr lang="de-DE" sz="800" b="0" i="0" u="none" strike="noStrike" dirty="0">
+                <a:solidFill>
+                  <a:schemeClr val="tx1">
+                    <a:lumMod val="65000"/>
+                    <a:lumOff val="35000"/>
+                  </a:schemeClr>
+                </a:solidFill>
+                <a:effectLst/>
+                <a:latin typeface="Avenir Book" panose="02000503020000020003" pitchFamily="2" charset="0"/>
+              </a:rPr>
+              <a:t>Namensnennung-Nicht kommerziell 4.0 International Lizenz.</a:t>
+            </a:r>
+          </a:p>
+          <a:p>
+            <a:pPr lvl="0" algn="ctr">
+              <a:defRPr sz="1800"/>
+            </a:pPr>
+            <a:r>
+              <a:rPr lang="de-DE" sz="800" dirty="0">
+                <a:solidFill>
+                  <a:schemeClr val="tx1">
+                    <a:lumMod val="65000"/>
+                    <a:lumOff val="35000"/>
+                  </a:schemeClr>
+                </a:solidFill>
+                <a:latin typeface="Avenir Book" panose="02000503020000020003" pitchFamily="2" charset="0"/>
+                <a:ea typeface="Calibri"/>
+                <a:cs typeface="Avenir Light"/>
+                <a:sym typeface="Calibri"/>
+              </a:rPr>
+              <a:t>Nachzulesen unter:</a:t>
+            </a:r>
+            <a:r>
+              <a:rPr sz="800" dirty="0">
+                <a:solidFill>
+                  <a:schemeClr val="tx1">
+                    <a:lumMod val="65000"/>
+                    <a:lumOff val="35000"/>
+                  </a:schemeClr>
+                </a:solidFill>
+                <a:latin typeface="Avenir Book" panose="02000503020000020003" pitchFamily="2" charset="0"/>
+                <a:ea typeface="Calibri"/>
+                <a:cs typeface="Avenir Light"/>
+                <a:sym typeface="Calibri"/>
+              </a:rPr>
+              <a:t> </a:t>
+            </a:r>
+            <a:r>
+              <a:rPr lang="de-DE" sz="800" dirty="0">
+                <a:solidFill>
+                  <a:schemeClr val="tx1">
+                    <a:lumMod val="65000"/>
+                    <a:lumOff val="35000"/>
+                  </a:schemeClr>
+                </a:solidFill>
+                <a:latin typeface="Avenir Book" panose="02000503020000020003" pitchFamily="2" charset="0"/>
+                <a:ea typeface="Calibri"/>
+                <a:cs typeface="Avenir Light"/>
+                <a:sym typeface="Calibri"/>
+              </a:rPr>
+              <a:t>https://</a:t>
+            </a:r>
+            <a:r>
+              <a:rPr lang="de-DE" sz="800" dirty="0" err="1">
+                <a:solidFill>
+                  <a:schemeClr val="tx1">
+                    <a:lumMod val="65000"/>
+                    <a:lumOff val="35000"/>
+                  </a:schemeClr>
+                </a:solidFill>
+                <a:latin typeface="Avenir Book" panose="02000503020000020003" pitchFamily="2" charset="0"/>
+                <a:ea typeface="Calibri"/>
+                <a:cs typeface="Avenir Light"/>
+                <a:sym typeface="Calibri"/>
+              </a:rPr>
+              <a:t>creativecommons.org</a:t>
+            </a:r>
+            <a:r>
+              <a:rPr lang="de-DE" sz="800" dirty="0">
+                <a:solidFill>
+                  <a:schemeClr val="tx1">
+                    <a:lumMod val="65000"/>
+                    <a:lumOff val="35000"/>
+                  </a:schemeClr>
+                </a:solidFill>
+                <a:latin typeface="Avenir Book" panose="02000503020000020003" pitchFamily="2" charset="0"/>
+                <a:ea typeface="Calibri"/>
+                <a:cs typeface="Avenir Light"/>
+                <a:sym typeface="Calibri"/>
+              </a:rPr>
+              <a:t>/</a:t>
+            </a:r>
+            <a:r>
+              <a:rPr lang="de-DE" sz="800" dirty="0" err="1">
+                <a:solidFill>
+                  <a:schemeClr val="tx1">
+                    <a:lumMod val="65000"/>
+                    <a:lumOff val="35000"/>
+                  </a:schemeClr>
+                </a:solidFill>
+                <a:latin typeface="Avenir Book" panose="02000503020000020003" pitchFamily="2" charset="0"/>
+                <a:ea typeface="Calibri"/>
+                <a:cs typeface="Avenir Light"/>
+                <a:sym typeface="Calibri"/>
+              </a:rPr>
+              <a:t>licenses</a:t>
+            </a:r>
+            <a:r>
+              <a:rPr lang="de-DE" sz="800" dirty="0">
+                <a:solidFill>
+                  <a:schemeClr val="tx1">
+                    <a:lumMod val="65000"/>
+                    <a:lumOff val="35000"/>
+                  </a:schemeClr>
+                </a:solidFill>
+                <a:latin typeface="Avenir Book" panose="02000503020000020003" pitchFamily="2" charset="0"/>
+                <a:ea typeface="Calibri"/>
+                <a:cs typeface="Avenir Light"/>
+                <a:sym typeface="Calibri"/>
+              </a:rPr>
+              <a:t>/</a:t>
+            </a:r>
+            <a:r>
+              <a:rPr lang="de-DE" sz="800" dirty="0" err="1">
+                <a:solidFill>
+                  <a:schemeClr val="tx1">
+                    <a:lumMod val="65000"/>
+                    <a:lumOff val="35000"/>
+                  </a:schemeClr>
+                </a:solidFill>
+                <a:latin typeface="Avenir Book" panose="02000503020000020003" pitchFamily="2" charset="0"/>
+                <a:ea typeface="Calibri"/>
+                <a:cs typeface="Avenir Light"/>
+                <a:sym typeface="Calibri"/>
+              </a:rPr>
+              <a:t>by-nc</a:t>
+            </a:r>
+            <a:r>
+              <a:rPr lang="de-DE" sz="800" dirty="0">
+                <a:solidFill>
+                  <a:schemeClr val="tx1">
+                    <a:lumMod val="65000"/>
+                    <a:lumOff val="35000"/>
+                  </a:schemeClr>
+                </a:solidFill>
+                <a:latin typeface="Avenir Book" panose="02000503020000020003" pitchFamily="2" charset="0"/>
+                <a:ea typeface="Calibri"/>
+                <a:cs typeface="Avenir Light"/>
+                <a:sym typeface="Calibri"/>
+              </a:rPr>
+              <a:t>/4.0/</a:t>
+            </a:r>
+            <a:r>
+              <a:rPr lang="de-DE" sz="800" dirty="0" err="1">
+                <a:solidFill>
+                  <a:schemeClr val="tx1">
+                    <a:lumMod val="65000"/>
+                    <a:lumOff val="35000"/>
+                  </a:schemeClr>
+                </a:solidFill>
+                <a:latin typeface="Avenir Book" panose="02000503020000020003" pitchFamily="2" charset="0"/>
+                <a:ea typeface="Calibri"/>
+                <a:cs typeface="Avenir Light"/>
+                <a:sym typeface="Calibri"/>
+              </a:rPr>
+              <a:t>deed.de</a:t>
+            </a:r>
+            <a:endParaRPr sz="800" dirty="0">
+              <a:solidFill>
+                <a:schemeClr val="tx1">
+                  <a:lumMod val="65000"/>
+                  <a:lumOff val="35000"/>
+                </a:schemeClr>
+              </a:solidFill>
+              <a:latin typeface="Avenir Book" panose="02000503020000020003" pitchFamily="2" charset="0"/>
+              <a:ea typeface="Calibri"/>
+              <a:cs typeface="Avenir Light"/>
+              <a:sym typeface="Calibri"/>
+            </a:endParaRPr>
+          </a:p>
+        </p:txBody>
+      </p:sp>
+      <p:pic>
+        <p:nvPicPr>
+          <p:cNvPr id="4" name="pasted-image.tif">
+            <a:extLst>
+              <a:ext uri="{FF2B5EF4-FFF2-40B4-BE49-F238E27FC236}">
+                <a16:creationId xmlns:a16="http://schemas.microsoft.com/office/drawing/2014/main" id="{BE540B6E-C689-78B5-5499-CFB936403138}"/>
+              </a:ext>
+            </a:extLst>
+          </p:cNvPr>
+          <p:cNvPicPr/>
+          <p:nvPr/>
+        </p:nvPicPr>
+        <p:blipFill rotWithShape="1">
+          <a:blip r:embed="rId2"/>
+          <a:srcRect r="24777" b="-3233"/>
+          <a:stretch/>
+        </p:blipFill>
+        <p:spPr>
+          <a:xfrm>
+            <a:off x="5724347" y="4733926"/>
+            <a:ext cx="1009828" cy="333374"/>
+          </a:xfrm>
+          <a:prstGeom prst="rect">
+            <a:avLst/>
+          </a:prstGeom>
+          <a:ln w="12700">
+            <a:miter lim="400000"/>
+          </a:ln>
+        </p:spPr>
+      </p:pic>
     </p:spTree>
     <p:extLst>
       <p:ext uri="{BB962C8B-B14F-4D97-AF65-F5344CB8AC3E}">

</xml_diff>

<commit_message>
SCR 11 Literatur einarbeiten, Rechtschreibung und Formulierungen verbessert
</commit_message>
<xml_diff>
--- a/training-cards/music moves/Scrum (SCR)/ger/apprentice/ger_SCR_11_Priorisieren_und_Pflegen_MM_A.pptx
+++ b/training-cards/music moves/Scrum (SCR)/ger/apprentice/ger_SCR_11_Priorisieren_und_Pflegen_MM_A.pptx
@@ -579,7 +579,7 @@
           <a:p>
             <a:fld id="{FF5B2BAF-DF38-0A48-A798-0C06E514FD52}" type="datetimeFigureOut">
               <a:rPr lang="de-DE" smtClean="0"/>
-              <a:t>27.07.23</a:t>
+              <a:t>28.07.24</a:t>
             </a:fld>
             <a:endParaRPr lang="de-DE" dirty="0"/>
           </a:p>
@@ -799,7 +799,7 @@
           <a:p>
             <a:fld id="{FF5B2BAF-DF38-0A48-A798-0C06E514FD52}" type="datetimeFigureOut">
               <a:rPr lang="de-DE" smtClean="0"/>
-              <a:t>27.07.23</a:t>
+              <a:t>28.07.24</a:t>
             </a:fld>
             <a:endParaRPr lang="de-DE" dirty="0"/>
           </a:p>
@@ -1467,16 +1467,37 @@
             <p:ph idx="13"/>
           </p:nvPr>
         </p:nvSpPr>
-        <p:spPr/>
+        <p:spPr>
+          <a:xfrm>
+            <a:off x="858838" y="1568452"/>
+            <a:ext cx="6217465" cy="3357775"/>
+          </a:xfrm>
+        </p:spPr>
         <p:txBody>
           <a:bodyPr>
             <a:noAutofit/>
           </a:bodyPr>
           <a:lstStyle/>
           <a:p>
+            <a:pPr algn="just"/>
             <a:r>
               <a:rPr lang="de-DE" sz="1200" dirty="0"/>
-              <a:t>Wenn Du bereits ein </a:t>
+              <a:t>Wenn Du bereits ein Backlog (vgl. Sutherland/</a:t>
+            </a:r>
+            <a:r>
+              <a:rPr lang="de-DE" sz="1200" dirty="0" err="1"/>
+              <a:t>Schwaber</a:t>
+            </a:r>
+            <a:r>
+              <a:rPr lang="de-DE" sz="1200" dirty="0"/>
+              <a:t> 2020, S. 11) angelegt hast (siehe SCR 10), kannst Du beginnen damit zu arbeiten.</a:t>
+            </a:r>
+          </a:p>
+          <a:p>
+            <a:pPr algn="just"/>
+            <a:r>
+              <a:rPr lang="de-DE" sz="1200" dirty="0"/>
+              <a:t>Ein </a:t>
             </a:r>
             <a:r>
               <a:rPr lang="de-DE" sz="1200" dirty="0" err="1"/>
@@ -1484,13 +1505,14 @@
             </a:r>
             <a:r>
               <a:rPr lang="de-DE" sz="1200" dirty="0"/>
-              <a:t> angelegt hast (siehe SCR 10), kannst Du beginnen damit zu arbeiten.</a:t>
-            </a:r>
-          </a:p>
-          <a:p>
+              <a:t> hat die Eigenschaft von oben nach unten durchpriorisiert zu sein. Das bedeutet, dass die Aufgabe, die ganz oben steht, auch die "wichtigste" Aufgabe ist. Die zweite ist die zweitwichtigste usw.</a:t>
+            </a:r>
+          </a:p>
+          <a:p>
+            <a:pPr algn="just"/>
             <a:r>
               <a:rPr lang="de-DE" sz="1200" dirty="0"/>
-              <a:t>Ein </a:t>
+              <a:t>Wenn Du also ein geordnetes </a:t>
             </a:r>
             <a:r>
               <a:rPr lang="de-DE" sz="1200" dirty="0" err="1"/>
@@ -1498,74 +1520,202 @@
             </a:r>
             <a:r>
               <a:rPr lang="de-DE" sz="1200" dirty="0"/>
-              <a:t> hat die Eigenschaft von oben nach unten durchpriorisiert zu sein. Das bedeutet, dass die Aufgabe, die ganz oben steht auch die "wichtigste" Aufgabe ist. Die zweite ist die zweitwichtigste usw.</a:t>
-            </a:r>
-          </a:p>
-          <a:p>
-            <a:r>
-              <a:rPr lang="de-DE" sz="1200" dirty="0"/>
-              <a:t>Wenn Du also ein geordnetes </a:t>
-            </a:r>
-            <a:r>
-              <a:rPr lang="de-DE" sz="1200" dirty="0" err="1"/>
-              <a:t>Backlog</a:t>
-            </a:r>
-            <a:r>
-              <a:rPr lang="de-DE" sz="1200" dirty="0"/>
               <a:t> hast, musst Du nicht mehr lange überlegen, was Du als nächstes tun sollst, denn Du siehst Deine Prioritäten auf einen Blick.</a:t>
             </a:r>
           </a:p>
           <a:p>
+            <a:pPr algn="just"/>
             <a:r>
               <a:rPr lang="de-DE" sz="1200" dirty="0"/>
               <a:t>Die Zeit, die Du dafür brauchst, diese Priorisierung zu erstellen, sparst Du Dir dadurch, dass Karenzzeiten wegfallen, in denen Du orientierungslos bist und nicht weißt, was als nächstes dran wäre.</a:t>
             </a:r>
           </a:p>
           <a:p>
+            <a:pPr algn="just"/>
             <a:r>
               <a:rPr lang="de-DE" sz="1200" dirty="0"/>
-              <a:t>In der </a:t>
+              <a:t>In der Softwareentwicklung wird dieser Vorgang „</a:t>
             </a:r>
             <a:r>
               <a:rPr lang="de-DE" sz="1200" dirty="0" err="1"/>
-              <a:t>Sofwareentwicklung</a:t>
+              <a:t>grooming</a:t>
             </a:r>
             <a:r>
               <a:rPr lang="de-DE" sz="1200" dirty="0"/>
-              <a:t> ist das so genannte "</a:t>
-            </a:r>
-            <a:r>
-              <a:rPr lang="de-DE" sz="1200" dirty="0" err="1"/>
-              <a:t>Backlog</a:t>
-            </a:r>
-            <a:r>
-              <a:rPr lang="de-DE" sz="1200" dirty="0"/>
+              <a:t>“ (Galen 2013, S. 81) genannt. Es geht darum die Elemente im Backlog zu prüfen, neu zu priorisieren und zu präzisieren (vgl. ebd., S. 81).</a:t>
+            </a:r>
+          </a:p>
+          <a:p>
+            <a:pPr marL="0" indent="0">
+              <a:buNone/>
+            </a:pPr>
+            <a:endParaRPr lang="de-DE" sz="800" dirty="0"/>
+          </a:p>
+          <a:p>
+            <a:pPr marL="0" indent="0">
+              <a:buNone/>
+            </a:pPr>
+            <a:r>
+              <a:rPr lang="de-DE" sz="800" dirty="0"/>
+              <a:t>Quellen:	Galen, Robert (2013): SCRUM </a:t>
+            </a:r>
+            <a:r>
+              <a:rPr lang="de-DE" sz="800" dirty="0" err="1"/>
+              <a:t>Product</a:t>
+            </a:r>
+            <a:r>
+              <a:rPr lang="de-DE" sz="800" dirty="0"/>
+              <a:t> Ownership. </a:t>
+            </a:r>
+            <a:r>
+              <a:rPr lang="de-DE" sz="800" dirty="0" err="1"/>
+              <a:t>Balancing</a:t>
+            </a:r>
+            <a:r>
+              <a:rPr lang="de-DE" sz="800" dirty="0"/>
+              <a:t> Value </a:t>
+            </a:r>
+            <a:r>
+              <a:rPr lang="de-DE" sz="800" dirty="0" err="1"/>
+              <a:t>from</a:t>
+            </a:r>
+            <a:r>
+              <a:rPr lang="de-DE" sz="800" dirty="0"/>
               <a:t> </a:t>
             </a:r>
             <a:r>
-              <a:rPr lang="de-DE" sz="1200" dirty="0" err="1"/>
-              <a:t>refinement</a:t>
-            </a:r>
-            <a:r>
-              <a:rPr lang="de-DE" sz="1200" dirty="0"/>
-              <a:t>", das die </a:t>
-            </a:r>
-            <a:r>
-              <a:rPr lang="de-DE" sz="1200" dirty="0" err="1"/>
-              <a:t>Neupriorisierung</a:t>
-            </a:r>
-            <a:r>
-              <a:rPr lang="de-DE" sz="1200" dirty="0"/>
-              <a:t> mit einschließt, ein fester Prozessschritt, wenn mit </a:t>
-            </a:r>
-            <a:r>
-              <a:rPr lang="de-DE" sz="1200" dirty="0" err="1"/>
-              <a:t>Backlogs</a:t>
-            </a:r>
-            <a:r>
-              <a:rPr lang="de-DE" sz="1200" dirty="0"/>
-              <a:t> gearbeitet wird.</a:t>
-            </a:r>
+              <a:rPr lang="de-DE" sz="800" dirty="0" err="1"/>
+              <a:t>the</a:t>
+            </a:r>
+            <a:r>
+              <a:rPr lang="de-DE" sz="800" dirty="0"/>
+              <a:t> Inside Out. Stories, </a:t>
+            </a:r>
+            <a:r>
+              <a:rPr lang="de-DE" sz="800" dirty="0" err="1"/>
+              <a:t>Ideas</a:t>
+            </a:r>
+            <a:r>
+              <a:rPr lang="de-DE" sz="800" dirty="0"/>
+              <a:t>, </a:t>
+            </a:r>
+            <a:r>
+              <a:rPr lang="de-DE" sz="800" dirty="0" err="1"/>
+              <a:t>Lessons</a:t>
+            </a:r>
+            <a:r>
+              <a:rPr lang="de-DE" sz="800" dirty="0"/>
+              <a:t>, and Practices </a:t>
+            </a:r>
+            <a:br>
+              <a:rPr lang="de-DE" sz="800" dirty="0"/>
+            </a:br>
+            <a:r>
+              <a:rPr lang="de-DE" sz="800" dirty="0"/>
+              <a:t>	</a:t>
+            </a:r>
+            <a:r>
+              <a:rPr lang="de-DE" sz="800" dirty="0" err="1"/>
+              <a:t>for</a:t>
+            </a:r>
+            <a:r>
+              <a:rPr lang="de-DE" sz="800" dirty="0"/>
+              <a:t> </a:t>
+            </a:r>
+            <a:r>
+              <a:rPr lang="de-DE" sz="800" dirty="0" err="1"/>
+              <a:t>Becoming</a:t>
+            </a:r>
+            <a:r>
+              <a:rPr lang="de-DE" sz="800" dirty="0"/>
+              <a:t> a Great </a:t>
+            </a:r>
+            <a:r>
+              <a:rPr lang="de-DE" sz="800" dirty="0" err="1"/>
+              <a:t>Product</a:t>
+            </a:r>
+            <a:r>
+              <a:rPr lang="de-DE" sz="800" dirty="0"/>
+              <a:t> </a:t>
+            </a:r>
+            <a:r>
+              <a:rPr lang="de-DE" sz="800" dirty="0" err="1"/>
+              <a:t>Owner</a:t>
+            </a:r>
+            <a:r>
+              <a:rPr lang="de-DE" sz="800" dirty="0"/>
+              <a:t>. 2. Auflage. O.O.: RGCG,LLC </a:t>
+            </a:r>
+            <a:br>
+              <a:rPr lang="de-DE" sz="800" dirty="0"/>
+            </a:br>
+            <a:r>
+              <a:rPr lang="de-DE" sz="800" dirty="0"/>
+              <a:t>	</a:t>
+            </a:r>
+            <a:r>
+              <a:rPr lang="de-DE" sz="800" dirty="0" err="1"/>
+              <a:t>Schwaber</a:t>
+            </a:r>
+            <a:r>
+              <a:rPr lang="de-DE" sz="800" dirty="0"/>
+              <a:t>, Ken/Sutherland, Jeff (2020): Der </a:t>
+            </a:r>
+            <a:r>
+              <a:rPr lang="de-DE" sz="800" dirty="0" err="1"/>
+              <a:t>Scrum</a:t>
+            </a:r>
+            <a:r>
+              <a:rPr lang="de-DE" sz="800" dirty="0"/>
+              <a:t> Guide. Der gültige Leitfaden für </a:t>
+            </a:r>
+            <a:r>
+              <a:rPr lang="de-DE" sz="800" dirty="0" err="1"/>
+              <a:t>Scrum</a:t>
+            </a:r>
+            <a:r>
+              <a:rPr lang="de-DE" sz="800" dirty="0"/>
+              <a:t>: Die Spielregeln. 	http://</a:t>
+            </a:r>
+            <a:r>
+              <a:rPr lang="de-DE" sz="800" dirty="0" err="1"/>
+              <a:t>scrumguides.org</a:t>
+            </a:r>
+            <a:r>
+              <a:rPr lang="de-DE" sz="800" dirty="0"/>
+              <a:t>/</a:t>
+            </a:r>
+            <a:r>
+              <a:rPr lang="de-DE" sz="800" dirty="0" err="1"/>
+              <a:t>docs</a:t>
+            </a:r>
+            <a:r>
+              <a:rPr lang="de-DE" sz="800" dirty="0"/>
+              <a:t>/</a:t>
+            </a:r>
+            <a:r>
+              <a:rPr lang="de-DE" sz="800" dirty="0" err="1"/>
+              <a:t>scrumguide</a:t>
+            </a:r>
+            <a:r>
+              <a:rPr lang="de-DE" sz="800" dirty="0"/>
+              <a:t>/v2020/2020-Scrum-Guide-German.pdf. Abgerufen am 25. Juli 2024</a:t>
+            </a:r>
+          </a:p>
+          <a:p>
+            <a:pPr marL="0" indent="0" algn="just">
+              <a:buNone/>
+            </a:pPr>
+            <a:r>
+              <a:rPr lang="de-DE" sz="800" dirty="0"/>
+              <a:t>	</a:t>
+            </a:r>
+          </a:p>
+          <a:p>
+            <a:pPr marL="0" indent="0">
+              <a:buNone/>
+            </a:pPr>
+            <a:endParaRPr lang="de-DE" sz="1200" dirty="0"/>
           </a:p>
         </p:txBody>
       </p:sp>
@@ -1636,67 +1786,64 @@
         </p:nvSpPr>
         <p:spPr/>
         <p:txBody>
-          <a:bodyPr/>
+          <a:bodyPr>
+            <a:normAutofit/>
+          </a:bodyPr>
           <a:lstStyle/>
           <a:p>
-            <a:r>
-              <a:rPr lang="de-DE" dirty="0"/>
+            <a:pPr algn="just"/>
+            <a:r>
+              <a:rPr lang="de-DE" sz="1200" dirty="0"/>
               <a:t>Pflege Dein </a:t>
             </a:r>
             <a:r>
-              <a:rPr lang="de-DE" dirty="0" err="1"/>
+              <a:rPr lang="de-DE" sz="1200" dirty="0" err="1"/>
               <a:t>Backlog</a:t>
             </a:r>
             <a:r>
-              <a:rPr lang="de-DE" dirty="0"/>
+              <a:rPr lang="de-DE" sz="1200" dirty="0"/>
               <a:t> in 2 Wochen 4 Mal.</a:t>
             </a:r>
           </a:p>
           <a:p>
-            <a:r>
-              <a:rPr lang="de-DE" dirty="0"/>
+            <a:pPr algn="just"/>
+            <a:r>
+              <a:rPr lang="de-DE" sz="1200" dirty="0"/>
               <a:t>Nimm Dir jeweils 10-15 min Zeit. Hier kannst Du das </a:t>
             </a:r>
             <a:r>
-              <a:rPr lang="de-DE" dirty="0" err="1"/>
+              <a:rPr lang="de-DE" sz="1200" dirty="0" err="1"/>
               <a:t>Backlog</a:t>
             </a:r>
             <a:r>
-              <a:rPr lang="de-DE" dirty="0"/>
+              <a:rPr lang="de-DE" sz="1200" dirty="0"/>
               <a:t> auf Dich wirken lassen und die Priorisierung der einzelnen Aufgaben verändern.</a:t>
             </a:r>
           </a:p>
           <a:p>
-            <a:r>
-              <a:rPr lang="de-DE" dirty="0"/>
-              <a:t>Du kannst erledigte Aufgaben entfernen oder auch neue hinzugeben. Nach Deiner Backlogpflege, sollte das </a:t>
-            </a:r>
-            <a:r>
-              <a:rPr lang="de-DE" dirty="0" err="1"/>
-              <a:t>Backlog</a:t>
-            </a:r>
-            <a:r>
-              <a:rPr lang="de-DE" dirty="0"/>
-              <a:t> den für Dich aktuellen Stand Deiner Priorisierung wiederspiegeln.</a:t>
-            </a:r>
-          </a:p>
-          <a:p>
-            <a:r>
-              <a:rPr lang="de-DE" dirty="0"/>
-              <a:t>Dokumentiere dein überarbeitetes </a:t>
-            </a:r>
-            <a:r>
-              <a:rPr lang="de-DE" dirty="0" err="1"/>
-              <a:t>Backlog</a:t>
-            </a:r>
-            <a:r>
-              <a:rPr lang="de-DE" dirty="0"/>
-              <a:t> jeweils mit einem Foto oder einem Screenshot.</a:t>
-            </a:r>
-          </a:p>
-          <a:p>
-            <a:r>
-              <a:rPr lang="de-DE" dirty="0"/>
+            <a:pPr algn="just"/>
+            <a:r>
+              <a:rPr lang="de-DE" sz="1200" dirty="0"/>
+              <a:t>Du kannst erledigte Aufgaben entfernen oder auch neue hinzugeben. Nach Deiner Backlogpflege sollte das Backlog den für Dich aktuellen Stand Deiner Priorisierung wiederspiegeln.</a:t>
+            </a:r>
+          </a:p>
+          <a:p>
+            <a:r>
+              <a:rPr lang="de-DE" sz="1200" dirty="0"/>
+              <a:t>Dokumentiere dein überarbeitetes Backlog jeweils mit einem Foto </a:t>
+            </a:r>
+            <a:br>
+              <a:rPr lang="de-DE" sz="1200" dirty="0"/>
+            </a:br>
+            <a:r>
+              <a:rPr lang="de-DE" sz="1200" dirty="0"/>
+              <a:t>oder einem Screenshot.</a:t>
+            </a:r>
+          </a:p>
+          <a:p>
+            <a:pPr algn="just"/>
+            <a:r>
+              <a:rPr lang="de-DE" sz="1200" dirty="0"/>
               <a:t>So kannst du es Deinem Team zeigen.</a:t>
             </a:r>
           </a:p>
@@ -1727,7 +1874,7 @@
           </a:ln>
           <a:extLst>
             <a:ext uri="{C572A759-6A51-4108-AA02-DFA0A04FC94B}">
-              <ma14:wrappingTextBoxFlag xmlns="" xmlns:ma14="http://schemas.microsoft.com/office/mac/drawingml/2011/main" val="1"/>
+              <ma14:wrappingTextBoxFlag xmlns:ma14="http://schemas.microsoft.com/office/mac/drawingml/2011/main" xmlns="" val="1"/>
             </a:ext>
           </a:extLst>
         </p:spPr>

</xml_diff>

<commit_message>
SCR 11 Kommas und Tippfehler
</commit_message>
<xml_diff>
--- a/training-cards/music moves/Scrum (SCR)/ger/apprentice/ger_SCR_11_Priorisieren_und_Pflegen_MM_A.pptx
+++ b/training-cards/music moves/Scrum (SCR)/ger/apprentice/ger_SCR_11_Priorisieren_und_Pflegen_MM_A.pptx
@@ -579,7 +579,7 @@
           <a:p>
             <a:fld id="{FF5B2BAF-DF38-0A48-A798-0C06E514FD52}" type="datetimeFigureOut">
               <a:rPr lang="de-DE" smtClean="0"/>
-              <a:t>30.07.24</a:t>
+              <a:t>11.09.25</a:t>
             </a:fld>
             <a:endParaRPr lang="de-DE" dirty="0"/>
           </a:p>
@@ -799,7 +799,7 @@
           <a:p>
             <a:fld id="{FF5B2BAF-DF38-0A48-A798-0C06E514FD52}" type="datetimeFigureOut">
               <a:rPr lang="de-DE" smtClean="0"/>
-              <a:t>30.07.24</a:t>
+              <a:t>11.09.25</a:t>
             </a:fld>
             <a:endParaRPr lang="de-DE" dirty="0"/>
           </a:p>
@@ -1490,14 +1490,21 @@
             </a:r>
             <a:r>
               <a:rPr lang="de-DE" sz="1200" dirty="0"/>
-              <a:t> 2020, S. 11) angelegt hast (siehe SCR 10), kannst Du beginnen damit zu arbeiten.</a:t>
+              <a:t> 2020, S. 11) angelegt hast (siehe SCR 10), kannst Du beginnen, damit zu arbeiten.</a:t>
             </a:r>
           </a:p>
           <a:p>
             <a:pPr algn="just"/>
             <a:r>
               <a:rPr lang="de-DE" sz="1200" dirty="0"/>
-              <a:t>Ein </a:t>
+              <a:t>Ein Backlog hat die Eigenschaft, von oben nach unten durchpriorisiert zu sein. Das bedeutet, dass die Aufgabe, die ganz oben steht, auch die "wichtigste" Aufgabe ist. Die zweite ist die zweitwichtigste usw.</a:t>
+            </a:r>
+          </a:p>
+          <a:p>
+            <a:pPr algn="just"/>
+            <a:r>
+              <a:rPr lang="de-DE" sz="1200" dirty="0"/>
+              <a:t>Wenn Du also ein geordnetes </a:t>
             </a:r>
             <a:r>
               <a:rPr lang="de-DE" sz="1200" dirty="0" err="1"/>
@@ -1505,21 +1512,6 @@
             </a:r>
             <a:r>
               <a:rPr lang="de-DE" sz="1200" dirty="0"/>
-              <a:t> hat die Eigenschaft von oben nach unten durchpriorisiert zu sein. Das bedeutet, dass die Aufgabe, die ganz oben steht, auch die "wichtigste" Aufgabe ist. Die zweite ist die zweitwichtigste usw.</a:t>
-            </a:r>
-          </a:p>
-          <a:p>
-            <a:pPr algn="just"/>
-            <a:r>
-              <a:rPr lang="de-DE" sz="1200" dirty="0"/>
-              <a:t>Wenn Du also ein geordnetes </a:t>
-            </a:r>
-            <a:r>
-              <a:rPr lang="de-DE" sz="1200" dirty="0" err="1"/>
-              <a:t>Backlog</a:t>
-            </a:r>
-            <a:r>
-              <a:rPr lang="de-DE" sz="1200" dirty="0"/>
               <a:t> hast, musst Du nicht mehr lange überlegen, was Du als nächstes tun sollst, denn Du siehst Deine Prioritäten auf einen Blick.</a:t>
             </a:r>
           </a:p>
@@ -1542,7 +1534,7 @@
             </a:r>
             <a:r>
               <a:rPr lang="de-DE" sz="1200" dirty="0"/>
-              <a:t>“ (Galen 2013, S. 81) genannt. Es geht darum die Elemente im Backlog zu prüfen, neu zu priorisieren und zu präzisieren (vgl. ebd., S. 81).</a:t>
+              <a:t>“ (Galen 2013, S. 81) genannt. Es geht darum, die Elemente im Backlog zu prüfen, neu zu priorisieren und zu präzisieren (vgl. ebd., S. 81).</a:t>
             </a:r>
           </a:p>
           <a:p>
@@ -1683,22 +1675,14 @@
             </a:r>
             <a:r>
               <a:rPr lang="de-DE" sz="800" dirty="0"/>
-              <a:t>: Die Spielregeln. </a:t>
-            </a:r>
-            <a:r>
-              <a:rPr lang="de-DE" sz="800"/>
-              <a:t>	</a:t>
+              <a:t>: Die Spielregeln. 	</a:t>
             </a:r>
             <a:br>
-              <a:rPr lang="de-DE" sz="800"/>
+              <a:rPr lang="de-DE" sz="800" dirty="0"/>
             </a:br>
             <a:r>
-              <a:rPr lang="de-DE" sz="800"/>
-              <a:t>                    http</a:t>
-            </a:r>
-            <a:r>
               <a:rPr lang="de-DE" sz="800" dirty="0"/>
-              <a:t>://</a:t>
+              <a:t>                    http://</a:t>
             </a:r>
             <a:r>
               <a:rPr lang="de-DE" sz="800" dirty="0" err="1"/>
@@ -1722,16 +1706,7 @@
             </a:r>
             <a:r>
               <a:rPr lang="de-DE" sz="800" dirty="0"/>
-              <a:t>/v2020/2020-Scrum-Guide-German.pdf. Abgerufen am 25. Juli 2024</a:t>
-            </a:r>
-          </a:p>
-          <a:p>
-            <a:pPr marL="0" indent="0" algn="just">
-              <a:buNone/>
-            </a:pPr>
-            <a:r>
-              <a:rPr lang="de-DE" sz="800" dirty="0"/>
-              <a:t>	</a:t>
+              <a:t>/v2020/2020-Scrum-Guide-German.pdf. Abgerufen am 11. September 2025	</a:t>
             </a:r>
           </a:p>
           <a:p>
@@ -1847,7 +1822,15 @@
             <a:pPr algn="just"/>
             <a:r>
               <a:rPr lang="de-DE" sz="1200" dirty="0"/>
-              <a:t>Du kannst erledigte Aufgaben entfernen oder auch neue hinzugeben. Nach Deiner Backlogpflege sollte das Backlog den für Dich aktuellen Stand Deiner Priorisierung wiederspiegeln.</a:t>
+              <a:t>Du kannst erledigte Aufgaben entfernen oder auch neue hinzugeben. Nach Deiner Backlogpflege sollte das Backlog den für Dich aktuellen Stand Deiner </a:t>
+            </a:r>
+            <a:r>
+              <a:rPr lang="de-DE" sz="1200"/>
+              <a:t>Priorisierung widerspiegeln</a:t>
+            </a:r>
+            <a:r>
+              <a:rPr lang="de-DE" sz="1200" dirty="0"/>
+              <a:t>.</a:t>
             </a:r>
           </a:p>
           <a:p>
@@ -1897,7 +1880,7 @@
           </a:ln>
           <a:extLst>
             <a:ext uri="{C572A759-6A51-4108-AA02-DFA0A04FC94B}">
-              <ma14:wrappingTextBoxFlag xmlns="" xmlns:ma14="http://schemas.microsoft.com/office/mac/drawingml/2011/main" val="1"/>
+              <ma14:wrappingTextBoxFlag xmlns:ma14="http://schemas.microsoft.com/office/mac/drawingml/2011/main" xmlns="" val="1"/>
             </a:ext>
           </a:extLst>
         </p:spPr>

</xml_diff>